<commit_message>
Updated PPTX with grading slide
</commit_message>
<xml_diff>
--- a/High School/Design and Drawing for Production/Unit 1 - Introduction & Design Process/Section 1 - Syllabus Overview and Classroom Operation/Assets/Unit 1 - Section 1 - Syllabus.pptx
+++ b/High School/Design and Drawing for Production/Unit 1 - Introduction & Design Process/Section 1 - Syllabus Overview and Classroom Operation/Assets/Unit 1 - Section 1 - Syllabus.pptx
@@ -5,17 +5,18 @@
     <p:sldMasterId id="2147483648" r:id="rId1"/>
   </p:sldMasterIdLst>
   <p:notesMasterIdLst>
-    <p:notesMasterId r:id="rId7"/>
+    <p:notesMasterId r:id="rId8"/>
   </p:notesMasterIdLst>
   <p:handoutMasterIdLst>
-    <p:handoutMasterId r:id="rId8"/>
+    <p:handoutMasterId r:id="rId9"/>
   </p:handoutMasterIdLst>
   <p:sldIdLst>
     <p:sldId id="268" r:id="rId2"/>
     <p:sldId id="269" r:id="rId3"/>
     <p:sldId id="271" r:id="rId4"/>
-    <p:sldId id="270" r:id="rId5"/>
-    <p:sldId id="272" r:id="rId6"/>
+    <p:sldId id="273" r:id="rId5"/>
+    <p:sldId id="270" r:id="rId6"/>
+    <p:sldId id="272" r:id="rId7"/>
   </p:sldIdLst>
   <p:sldSz cx="12192000" cy="6858000"/>
   <p:notesSz cx="6858000" cy="9144000"/>
@@ -218,7 +219,7 @@
           <a:p>
             <a:fld id="{6AC4FB8F-ED15-48AB-97BD-17129D4E699D}" type="datetimeFigureOut">
               <a:rPr lang="en-US" smtClean="0"/>
-              <a:t>9/4/2018</a:t>
+              <a:t>9/5/2018</a:t>
             </a:fld>
             <a:endParaRPr lang="en-US" dirty="0"/>
           </a:p>
@@ -383,7 +384,7 @@
           <a:p>
             <a:fld id="{BBC9D437-CD83-4825-AD0D-5E7B341BC79B}" type="datetimeFigureOut">
               <a:rPr lang="en-US" smtClean="0"/>
-              <a:t>9/4/2018</a:t>
+              <a:t>9/5/2018</a:t>
             </a:fld>
             <a:endParaRPr lang="en-US" dirty="0"/>
           </a:p>
@@ -809,7 +810,7 @@
           <a:p>
             <a:fld id="{85AB7CBB-843F-464A-A764-71D6ADC27CFA}" type="datetime1">
               <a:rPr lang="en-US" smtClean="0"/>
-              <a:t>9/4/2018</a:t>
+              <a:t>9/5/2018</a:t>
             </a:fld>
             <a:endParaRPr lang="en-US" dirty="0"/>
           </a:p>
@@ -994,7 +995,7 @@
           <a:p>
             <a:fld id="{CBEFC03D-3A1F-4813-9337-02411FCC3A9A}" type="datetime1">
               <a:rPr lang="en-US" smtClean="0"/>
-              <a:t>9/4/2018</a:t>
+              <a:t>9/5/2018</a:t>
             </a:fld>
             <a:endParaRPr lang="en-US" dirty="0"/>
           </a:p>
@@ -1192,7 +1193,7 @@
           <a:p>
             <a:fld id="{3D638F79-DFA0-4C26-9553-23A017B69AB6}" type="datetime1">
               <a:rPr lang="en-US" smtClean="0"/>
-              <a:t>9/4/2018</a:t>
+              <a:t>9/5/2018</a:t>
             </a:fld>
             <a:endParaRPr lang="en-US" dirty="0"/>
           </a:p>
@@ -1386,7 +1387,7 @@
           <a:p>
             <a:fld id="{A70B34E7-E1D9-4FBF-A1A0-4009669A00BF}" type="datetime1">
               <a:rPr lang="en-US" smtClean="0"/>
-              <a:t>9/4/2018</a:t>
+              <a:t>9/5/2018</a:t>
             </a:fld>
             <a:endParaRPr lang="en-US" dirty="0"/>
           </a:p>
@@ -1875,7 +1876,7 @@
           <a:p>
             <a:fld id="{7579E8B6-2F47-420B-83EA-EB2285D13EC9}" type="datetime1">
               <a:rPr lang="en-US" smtClean="0"/>
-              <a:t>9/4/2018</a:t>
+              <a:t>9/5/2018</a:t>
             </a:fld>
             <a:endParaRPr lang="en-US" dirty="0"/>
           </a:p>
@@ -2313,7 +2314,7 @@
           <a:p>
             <a:fld id="{2304803D-B10E-4B90-8456-A0E05393E233}" type="datetime1">
               <a:rPr lang="en-US" smtClean="0"/>
-              <a:t>9/4/2018</a:t>
+              <a:t>9/5/2018</a:t>
             </a:fld>
             <a:endParaRPr lang="en-US" dirty="0"/>
           </a:p>
@@ -2446,7 +2447,7 @@
           <a:p>
             <a:fld id="{CCE1E62F-6CCE-4064-96C2-2084AF883904}" type="datetime1">
               <a:rPr lang="en-US" smtClean="0"/>
-              <a:t>9/4/2018</a:t>
+              <a:t>9/5/2018</a:t>
             </a:fld>
             <a:endParaRPr lang="en-US" dirty="0"/>
           </a:p>
@@ -2556,7 +2557,7 @@
           <a:p>
             <a:fld id="{AA615CA6-EC4D-4728-8AA6-534BE7E9B67C}" type="datetime1">
               <a:rPr lang="en-US" smtClean="0"/>
-              <a:t>9/4/2018</a:t>
+              <a:t>9/5/2018</a:t>
             </a:fld>
             <a:endParaRPr lang="en-US" dirty="0"/>
           </a:p>
@@ -2870,7 +2871,7 @@
           <a:p>
             <a:fld id="{A6139942-0A2E-443A-842F-D6DE74360370}" type="datetime1">
               <a:rPr lang="en-US" smtClean="0"/>
-              <a:t>9/4/2018</a:t>
+              <a:t>9/5/2018</a:t>
             </a:fld>
             <a:endParaRPr lang="en-US" dirty="0"/>
           </a:p>
@@ -3387,7 +3388,7 @@
           <a:p>
             <a:fld id="{3F138946-C5C1-4A11-BA69-F12F43F8A94B}" type="datetime1">
               <a:rPr lang="en-US" smtClean="0"/>
-              <a:t>9/4/2018</a:t>
+              <a:t>9/5/2018</a:t>
             </a:fld>
             <a:endParaRPr lang="en-US" dirty="0"/>
           </a:p>
@@ -4270,6 +4271,182 @@
           <a:p>
             <a:r>
               <a:rPr lang="en-US" dirty="0"/>
+              <a:t>grading</a:t>
+            </a:r>
+          </a:p>
+        </p:txBody>
+      </p:sp>
+      <p:sp>
+        <p:nvSpPr>
+          <p:cNvPr id="3" name="Content Placeholder 2"/>
+          <p:cNvSpPr>
+            <a:spLocks noGrp="1"/>
+          </p:cNvSpPr>
+          <p:nvPr>
+            <p:ph idx="1"/>
+          </p:nvPr>
+        </p:nvSpPr>
+        <p:spPr/>
+        <p:txBody>
+          <a:bodyPr/>
+          <a:lstStyle/>
+          <a:p>
+            <a:r>
+              <a:rPr lang="en-US" dirty="0">
+                <a:cs typeface="Arial" pitchFamily="34" charset="0"/>
+              </a:rPr>
+              <a:t>Assignments – </a:t>
+            </a:r>
+            <a:r>
+              <a:rPr lang="en-US" b="1" dirty="0">
+                <a:cs typeface="Arial" pitchFamily="34" charset="0"/>
+              </a:rPr>
+              <a:t>62.5%</a:t>
+            </a:r>
+          </a:p>
+          <a:p>
+            <a:r>
+              <a:rPr lang="en-US" dirty="0">
+                <a:cs typeface="Arial" pitchFamily="34" charset="0"/>
+              </a:rPr>
+              <a:t>Do </a:t>
+            </a:r>
+            <a:r>
+              <a:rPr lang="en-US" dirty="0" err="1">
+                <a:cs typeface="Arial" pitchFamily="34" charset="0"/>
+              </a:rPr>
+              <a:t>Nows</a:t>
+            </a:r>
+            <a:r>
+              <a:rPr lang="en-US" dirty="0">
+                <a:cs typeface="Arial" pitchFamily="34" charset="0"/>
+              </a:rPr>
+              <a:t> – </a:t>
+            </a:r>
+            <a:r>
+              <a:rPr lang="en-US" b="1" dirty="0">
+                <a:cs typeface="Arial" pitchFamily="34" charset="0"/>
+              </a:rPr>
+              <a:t>2.5%</a:t>
+            </a:r>
+          </a:p>
+          <a:p>
+            <a:r>
+              <a:rPr lang="en-US" dirty="0">
+                <a:cs typeface="Arial" pitchFamily="34" charset="0"/>
+              </a:rPr>
+              <a:t>Presentations – </a:t>
+            </a:r>
+            <a:r>
+              <a:rPr lang="en-US" b="1" dirty="0">
+                <a:cs typeface="Arial" pitchFamily="34" charset="0"/>
+              </a:rPr>
+              <a:t>7.5 %</a:t>
+            </a:r>
+          </a:p>
+          <a:p>
+            <a:r>
+              <a:rPr lang="en-US" dirty="0">
+                <a:cs typeface="Arial" pitchFamily="34" charset="0"/>
+              </a:rPr>
+              <a:t>Tests – </a:t>
+            </a:r>
+            <a:r>
+              <a:rPr lang="en-US" b="1" dirty="0">
+                <a:cs typeface="Arial" pitchFamily="34" charset="0"/>
+              </a:rPr>
+              <a:t>27.5%</a:t>
+            </a:r>
+          </a:p>
+        </p:txBody>
+      </p:sp>
+      <p:sp>
+        <p:nvSpPr>
+          <p:cNvPr id="4" name="Footer Placeholder 3">
+            <a:extLst>
+              <a:ext uri="{FF2B5EF4-FFF2-40B4-BE49-F238E27FC236}">
+                <a16:creationId xmlns:a16="http://schemas.microsoft.com/office/drawing/2014/main" id="{EADFB87E-2A3F-4815-8F5E-3CF3521EBF24}"/>
+              </a:ext>
+            </a:extLst>
+          </p:cNvPr>
+          <p:cNvSpPr>
+            <a:spLocks noGrp="1"/>
+          </p:cNvSpPr>
+          <p:nvPr>
+            <p:ph type="ftr" sz="quarter" idx="11"/>
+          </p:nvPr>
+        </p:nvSpPr>
+        <p:spPr/>
+        <p:txBody>
+          <a:bodyPr/>
+          <a:lstStyle/>
+          <a:p>
+            <a:r>
+              <a:rPr lang="en-US" dirty="0"/>
+              <a:t>Unit 1 – Section 1 - Day 1</a:t>
+            </a:r>
+          </a:p>
+        </p:txBody>
+      </p:sp>
+    </p:spTree>
+    <p:extLst>
+      <p:ext uri="{BB962C8B-B14F-4D97-AF65-F5344CB8AC3E}">
+        <p14:creationId xmlns:p14="http://schemas.microsoft.com/office/powerpoint/2010/main" val="1324485758"/>
+      </p:ext>
+    </p:extLst>
+  </p:cSld>
+  <p:clrMapOvr>
+    <a:masterClrMapping/>
+  </p:clrMapOvr>
+  <mc:AlternateContent xmlns:mc="http://schemas.openxmlformats.org/markup-compatibility/2006" xmlns:p14="http://schemas.microsoft.com/office/powerpoint/2010/main">
+    <mc:Choice Requires="p14">
+      <p:transition spd="med" p14:dur="700">
+        <p:fade/>
+      </p:transition>
+    </mc:Choice>
+    <mc:Fallback xmlns="">
+      <p:transition spd="med">
+        <p:fade/>
+      </p:transition>
+    </mc:Fallback>
+  </mc:AlternateContent>
+</p:sld>
+</file>
+
+<file path=ppt/slides/slide5.xml><?xml version="1.0" encoding="utf-8"?>
+<p:sld xmlns:a="http://schemas.openxmlformats.org/drawingml/2006/main" xmlns:r="http://schemas.openxmlformats.org/officeDocument/2006/relationships" xmlns:p="http://schemas.openxmlformats.org/presentationml/2006/main">
+  <p:cSld>
+    <p:spTree>
+      <p:nvGrpSpPr>
+        <p:cNvPr id="1" name=""/>
+        <p:cNvGrpSpPr/>
+        <p:nvPr/>
+      </p:nvGrpSpPr>
+      <p:grpSpPr>
+        <a:xfrm>
+          <a:off x="0" y="0"/>
+          <a:ext cx="0" cy="0"/>
+          <a:chOff x="0" y="0"/>
+          <a:chExt cx="0" cy="0"/>
+        </a:xfrm>
+      </p:grpSpPr>
+      <p:sp>
+        <p:nvSpPr>
+          <p:cNvPr id="2" name="Title 1"/>
+          <p:cNvSpPr>
+            <a:spLocks noGrp="1"/>
+          </p:cNvSpPr>
+          <p:nvPr>
+            <p:ph type="title"/>
+          </p:nvPr>
+        </p:nvSpPr>
+        <p:spPr/>
+        <p:txBody>
+          <a:bodyPr/>
+          <a:lstStyle/>
+          <a:p>
+            <a:r>
+              <a:rPr lang="en-US" dirty="0"/>
               <a:t>Course Syllabus</a:t>
             </a:r>
           </a:p>
@@ -4300,7 +4477,10 @@
             </a:r>
           </a:p>
           <a:p>
-            <a:pPr lvl="1"/>
+            <a:pPr marL="868680" lvl="1" indent="-457200">
+              <a:buFont typeface="+mj-lt"/>
+              <a:buAutoNum type="arabicPeriod"/>
+            </a:pPr>
             <a:r>
               <a:rPr lang="en-US" dirty="0">
                 <a:cs typeface="Arial" pitchFamily="34" charset="0"/>
@@ -4309,7 +4489,10 @@
             </a:r>
           </a:p>
           <a:p>
-            <a:pPr lvl="1"/>
+            <a:pPr marL="868680" lvl="1" indent="-457200">
+              <a:buFont typeface="+mj-lt"/>
+              <a:buAutoNum type="arabicPeriod"/>
+            </a:pPr>
             <a:r>
               <a:rPr lang="en-US" dirty="0">
                 <a:cs typeface="Arial" pitchFamily="34" charset="0"/>
@@ -4318,7 +4501,10 @@
             </a:r>
           </a:p>
           <a:p>
-            <a:pPr lvl="1"/>
+            <a:pPr marL="868680" lvl="1" indent="-457200">
+              <a:buFont typeface="+mj-lt"/>
+              <a:buAutoNum type="arabicPeriod"/>
+            </a:pPr>
             <a:r>
               <a:rPr lang="en-US" dirty="0">
                 <a:cs typeface="Arial" pitchFamily="34" charset="0"/>
@@ -4327,7 +4513,10 @@
             </a:r>
           </a:p>
           <a:p>
-            <a:pPr lvl="1"/>
+            <a:pPr marL="868680" lvl="1" indent="-457200">
+              <a:buFont typeface="+mj-lt"/>
+              <a:buAutoNum type="arabicPeriod"/>
+            </a:pPr>
             <a:r>
               <a:rPr lang="en-US" dirty="0">
                 <a:cs typeface="Arial" pitchFamily="34" charset="0"/>
@@ -4336,7 +4525,10 @@
             </a:r>
           </a:p>
           <a:p>
-            <a:pPr lvl="1"/>
+            <a:pPr marL="868680" lvl="1" indent="-457200">
+              <a:buFont typeface="+mj-lt"/>
+              <a:buAutoNum type="arabicPeriod"/>
+            </a:pPr>
             <a:r>
               <a:rPr lang="en-US" dirty="0">
                 <a:cs typeface="Arial" pitchFamily="34" charset="0"/>
@@ -4345,7 +4537,10 @@
             </a:r>
           </a:p>
           <a:p>
-            <a:pPr lvl="1"/>
+            <a:pPr marL="868680" lvl="1" indent="-457200">
+              <a:buFont typeface="+mj-lt"/>
+              <a:buAutoNum type="arabicPeriod"/>
+            </a:pPr>
             <a:r>
               <a:rPr lang="en-US" dirty="0">
                 <a:cs typeface="Arial" pitchFamily="34" charset="0"/>
@@ -4354,7 +4549,10 @@
             </a:r>
           </a:p>
           <a:p>
-            <a:pPr lvl="1"/>
+            <a:pPr marL="868680" lvl="1" indent="-457200">
+              <a:buFont typeface="+mj-lt"/>
+              <a:buAutoNum type="arabicPeriod"/>
+            </a:pPr>
             <a:r>
               <a:rPr lang="en-US" dirty="0">
                 <a:cs typeface="Arial" pitchFamily="34" charset="0"/>
@@ -4363,7 +4561,10 @@
             </a:r>
           </a:p>
           <a:p>
-            <a:pPr lvl="1"/>
+            <a:pPr marL="868680" lvl="1" indent="-457200">
+              <a:buFont typeface="+mj-lt"/>
+              <a:buAutoNum type="arabicPeriod"/>
+            </a:pPr>
             <a:r>
               <a:rPr lang="en-US" dirty="0">
                 <a:cs typeface="Arial" pitchFamily="34" charset="0"/>
@@ -4372,7 +4573,10 @@
             </a:r>
           </a:p>
           <a:p>
-            <a:pPr lvl="1"/>
+            <a:pPr marL="868680" lvl="1" indent="-457200">
+              <a:buFont typeface="+mj-lt"/>
+              <a:buAutoNum type="arabicPeriod"/>
+            </a:pPr>
             <a:r>
               <a:rPr lang="en-US" dirty="0">
                 <a:cs typeface="Arial" pitchFamily="34" charset="0"/>
@@ -4381,7 +4585,10 @@
             </a:r>
           </a:p>
           <a:p>
-            <a:pPr lvl="1"/>
+            <a:pPr marL="868680" lvl="1" indent="-457200">
+              <a:buFont typeface="+mj-lt"/>
+              <a:buAutoNum type="arabicPeriod"/>
+            </a:pPr>
             <a:r>
               <a:rPr lang="en-US" dirty="0">
                 <a:cs typeface="Arial" pitchFamily="34" charset="0"/>
@@ -4390,7 +4597,10 @@
             </a:r>
           </a:p>
           <a:p>
-            <a:pPr lvl="1"/>
+            <a:pPr marL="868680" lvl="1" indent="-457200">
+              <a:buFont typeface="+mj-lt"/>
+              <a:buAutoNum type="arabicPeriod"/>
+            </a:pPr>
             <a:r>
               <a:rPr lang="en-US" dirty="0">
                 <a:cs typeface="Arial" pitchFamily="34" charset="0"/>
@@ -4453,7 +4663,7 @@
 </p:sld>
 </file>
 
-<file path=ppt/slides/slide5.xml><?xml version="1.0" encoding="utf-8"?>
+<file path=ppt/slides/slide6.xml><?xml version="1.0" encoding="utf-8"?>
 <p:sld xmlns:a="http://schemas.openxmlformats.org/drawingml/2006/main" xmlns:r="http://schemas.openxmlformats.org/officeDocument/2006/relationships" xmlns:p="http://schemas.openxmlformats.org/presentationml/2006/main">
   <p:cSld>
     <p:spTree>

</xml_diff>